<commit_message>
Deployed  with MkDocs version: 1.3.1
</commit_message>
<xml_diff>
--- a/assets/craft_vision.pptx
+++ b/assets/craft_vision.pptx
@@ -6,6 +6,7 @@
   </p:sldMasterIdLst>
   <p:sldIdLst>
     <p:sldId id="256" r:id="rId2"/>
+    <p:sldId id="257" r:id="rId3"/>
   </p:sldIdLst>
   <p:sldSz cx="12192000" cy="6858000"/>
   <p:notesSz cx="6858000" cy="9144000"/>
@@ -104,6 +105,11 @@
       </a:defRPr>
     </a:lvl9pPr>
   </p:defaultTextStyle>
+  <p:extLst>
+    <p:ext uri="{EFAFB233-063F-42B5-8137-9DF3F51BA10A}">
+      <p15:sldGuideLst xmlns:p15="http://schemas.microsoft.com/office/powerpoint/2012/main"/>
+    </p:ext>
+  </p:extLst>
 </p:presentation>
 </file>
 
@@ -254,7 +260,7 @@
           <a:p>
             <a:fld id="{A826E1A6-B7AB-5944-86C2-8DD2102280C9}" type="datetimeFigureOut">
               <a:rPr lang="fr-FR" smtClean="0"/>
-              <a:t>14/03/2023</a:t>
+              <a:t>15/03/2023</a:t>
             </a:fld>
             <a:endParaRPr lang="fr-FR"/>
           </a:p>
@@ -452,7 +458,7 @@
           <a:p>
             <a:fld id="{A826E1A6-B7AB-5944-86C2-8DD2102280C9}" type="datetimeFigureOut">
               <a:rPr lang="fr-FR" smtClean="0"/>
-              <a:t>14/03/2023</a:t>
+              <a:t>15/03/2023</a:t>
             </a:fld>
             <a:endParaRPr lang="fr-FR"/>
           </a:p>
@@ -660,7 +666,7 @@
           <a:p>
             <a:fld id="{A826E1A6-B7AB-5944-86C2-8DD2102280C9}" type="datetimeFigureOut">
               <a:rPr lang="fr-FR" smtClean="0"/>
-              <a:t>14/03/2023</a:t>
+              <a:t>15/03/2023</a:t>
             </a:fld>
             <a:endParaRPr lang="fr-FR"/>
           </a:p>
@@ -858,7 +864,7 @@
           <a:p>
             <a:fld id="{A826E1A6-B7AB-5944-86C2-8DD2102280C9}" type="datetimeFigureOut">
               <a:rPr lang="fr-FR" smtClean="0"/>
-              <a:t>14/03/2023</a:t>
+              <a:t>15/03/2023</a:t>
             </a:fld>
             <a:endParaRPr lang="fr-FR"/>
           </a:p>
@@ -1133,7 +1139,7 @@
           <a:p>
             <a:fld id="{A826E1A6-B7AB-5944-86C2-8DD2102280C9}" type="datetimeFigureOut">
               <a:rPr lang="fr-FR" smtClean="0"/>
-              <a:t>14/03/2023</a:t>
+              <a:t>15/03/2023</a:t>
             </a:fld>
             <a:endParaRPr lang="fr-FR"/>
           </a:p>
@@ -1398,7 +1404,7 @@
           <a:p>
             <a:fld id="{A826E1A6-B7AB-5944-86C2-8DD2102280C9}" type="datetimeFigureOut">
               <a:rPr lang="fr-FR" smtClean="0"/>
-              <a:t>14/03/2023</a:t>
+              <a:t>15/03/2023</a:t>
             </a:fld>
             <a:endParaRPr lang="fr-FR"/>
           </a:p>
@@ -1810,7 +1816,7 @@
           <a:p>
             <a:fld id="{A826E1A6-B7AB-5944-86C2-8DD2102280C9}" type="datetimeFigureOut">
               <a:rPr lang="fr-FR" smtClean="0"/>
-              <a:t>14/03/2023</a:t>
+              <a:t>15/03/2023</a:t>
             </a:fld>
             <a:endParaRPr lang="fr-FR"/>
           </a:p>
@@ -1951,7 +1957,7 @@
           <a:p>
             <a:fld id="{A826E1A6-B7AB-5944-86C2-8DD2102280C9}" type="datetimeFigureOut">
               <a:rPr lang="fr-FR" smtClean="0"/>
-              <a:t>14/03/2023</a:t>
+              <a:t>15/03/2023</a:t>
             </a:fld>
             <a:endParaRPr lang="fr-FR"/>
           </a:p>
@@ -2064,7 +2070,7 @@
           <a:p>
             <a:fld id="{A826E1A6-B7AB-5944-86C2-8DD2102280C9}" type="datetimeFigureOut">
               <a:rPr lang="fr-FR" smtClean="0"/>
-              <a:t>14/03/2023</a:t>
+              <a:t>15/03/2023</a:t>
             </a:fld>
             <a:endParaRPr lang="fr-FR"/>
           </a:p>
@@ -2375,7 +2381,7 @@
           <a:p>
             <a:fld id="{A826E1A6-B7AB-5944-86C2-8DD2102280C9}" type="datetimeFigureOut">
               <a:rPr lang="fr-FR" smtClean="0"/>
-              <a:t>14/03/2023</a:t>
+              <a:t>15/03/2023</a:t>
             </a:fld>
             <a:endParaRPr lang="fr-FR"/>
           </a:p>
@@ -2663,7 +2669,7 @@
           <a:p>
             <a:fld id="{A826E1A6-B7AB-5944-86C2-8DD2102280C9}" type="datetimeFigureOut">
               <a:rPr lang="fr-FR" smtClean="0"/>
-              <a:t>14/03/2023</a:t>
+              <a:t>15/03/2023</a:t>
             </a:fld>
             <a:endParaRPr lang="fr-FR"/>
           </a:p>
@@ -2904,7 +2910,7 @@
           <a:p>
             <a:fld id="{A826E1A6-B7AB-5944-86C2-8DD2102280C9}" type="datetimeFigureOut">
               <a:rPr lang="fr-FR" smtClean="0"/>
-              <a:t>14/03/2023</a:t>
+              <a:t>15/03/2023</a:t>
             </a:fld>
             <a:endParaRPr lang="fr-FR"/>
           </a:p>
@@ -3880,6 +3886,439 @@
 </p:sld>
 </file>
 
+<file path=ppt/slides/slide2.xml><?xml version="1.0" encoding="utf-8"?>
+<p:sld xmlns:a="http://schemas.openxmlformats.org/drawingml/2006/main" xmlns:r="http://schemas.openxmlformats.org/officeDocument/2006/relationships" xmlns:p="http://schemas.openxmlformats.org/presentationml/2006/main">
+  <p:cSld>
+    <p:spTree>
+      <p:nvGrpSpPr>
+        <p:cNvPr id="1" name=""/>
+        <p:cNvGrpSpPr/>
+        <p:nvPr/>
+      </p:nvGrpSpPr>
+      <p:grpSpPr>
+        <a:xfrm>
+          <a:off x="0" y="0"/>
+          <a:ext cx="0" cy="0"/>
+          <a:chOff x="0" y="0"/>
+          <a:chExt cx="0" cy="0"/>
+        </a:xfrm>
+      </p:grpSpPr>
+      <p:grpSp>
+        <p:nvGrpSpPr>
+          <p:cNvPr id="3" name="Groupe 2">
+            <a:extLst>
+              <a:ext uri="{FF2B5EF4-FFF2-40B4-BE49-F238E27FC236}">
+                <a16:creationId xmlns:a16="http://schemas.microsoft.com/office/drawing/2014/main" id="{9FB62725-19C4-E7A3-2514-0378CEE4567B}"/>
+              </a:ext>
+            </a:extLst>
+          </p:cNvPr>
+          <p:cNvGrpSpPr/>
+          <p:nvPr/>
+        </p:nvGrpSpPr>
+        <p:grpSpPr>
+          <a:xfrm>
+            <a:off x="1165228" y="722798"/>
+            <a:ext cx="3762704" cy="3762704"/>
+            <a:chOff x="1165228" y="722798"/>
+            <a:chExt cx="3762704" cy="3762704"/>
+          </a:xfrm>
+        </p:grpSpPr>
+        <p:grpSp>
+          <p:nvGrpSpPr>
+            <p:cNvPr id="7" name="Groupe 6">
+              <a:extLst>
+                <a:ext uri="{FF2B5EF4-FFF2-40B4-BE49-F238E27FC236}">
+                  <a16:creationId xmlns:a16="http://schemas.microsoft.com/office/drawing/2014/main" id="{3CD6B67C-88F6-9EC1-78D0-A636B9D61030}"/>
+                </a:ext>
+              </a:extLst>
+            </p:cNvPr>
+            <p:cNvGrpSpPr/>
+            <p:nvPr/>
+          </p:nvGrpSpPr>
+          <p:grpSpPr>
+            <a:xfrm>
+              <a:off x="1165228" y="722798"/>
+              <a:ext cx="3762704" cy="3762704"/>
+              <a:chOff x="1807779" y="998483"/>
+              <a:chExt cx="3762704" cy="3762704"/>
+            </a:xfrm>
+          </p:grpSpPr>
+          <p:sp>
+            <p:nvSpPr>
+              <p:cNvPr id="4" name="Ellipse 3">
+                <a:extLst>
+                  <a:ext uri="{FF2B5EF4-FFF2-40B4-BE49-F238E27FC236}">
+                    <a16:creationId xmlns:a16="http://schemas.microsoft.com/office/drawing/2014/main" id="{048318DD-8FBB-EAC6-9404-4B7C708E7F92}"/>
+                  </a:ext>
+                </a:extLst>
+              </p:cNvPr>
+              <p:cNvSpPr/>
+              <p:nvPr/>
+            </p:nvSpPr>
+            <p:spPr>
+              <a:xfrm>
+                <a:off x="1807779" y="998483"/>
+                <a:ext cx="3762704" cy="3762704"/>
+              </a:xfrm>
+              <a:prstGeom prst="ellipse">
+                <a:avLst/>
+              </a:prstGeom>
+              <a:solidFill>
+                <a:srgbClr val="292929"/>
+              </a:solidFill>
+              <a:ln w="76200">
+                <a:noFill/>
+                <a:prstDash val="solid"/>
+                <a:extLst>
+                  <a:ext uri="{C807C97D-BFC1-408E-A445-0C87EB9F89A2}">
+                    <ask:lineSketchStyleProps xmlns:ask="http://schemas.microsoft.com/office/drawing/2018/sketchyshapes" sd="1219033472">
+                      <a:custGeom>
+                        <a:avLst/>
+                        <a:gdLst>
+                          <a:gd name="connsiteX0" fmla="*/ 0 w 3762704"/>
+                          <a:gd name="connsiteY0" fmla="*/ 1881352 h 3762704"/>
+                          <a:gd name="connsiteX1" fmla="*/ 1881352 w 3762704"/>
+                          <a:gd name="connsiteY1" fmla="*/ 0 h 3762704"/>
+                          <a:gd name="connsiteX2" fmla="*/ 3762704 w 3762704"/>
+                          <a:gd name="connsiteY2" fmla="*/ 1881352 h 3762704"/>
+                          <a:gd name="connsiteX3" fmla="*/ 1881352 w 3762704"/>
+                          <a:gd name="connsiteY3" fmla="*/ 3762704 h 3762704"/>
+                          <a:gd name="connsiteX4" fmla="*/ 0 w 3762704"/>
+                          <a:gd name="connsiteY4" fmla="*/ 1881352 h 3762704"/>
+                        </a:gdLst>
+                        <a:ahLst/>
+                        <a:cxnLst>
+                          <a:cxn ang="0">
+                            <a:pos x="connsiteX0" y="connsiteY0"/>
+                          </a:cxn>
+                          <a:cxn ang="0">
+                            <a:pos x="connsiteX1" y="connsiteY1"/>
+                          </a:cxn>
+                          <a:cxn ang="0">
+                            <a:pos x="connsiteX2" y="connsiteY2"/>
+                          </a:cxn>
+                          <a:cxn ang="0">
+                            <a:pos x="connsiteX3" y="connsiteY3"/>
+                          </a:cxn>
+                          <a:cxn ang="0">
+                            <a:pos x="connsiteX4" y="connsiteY4"/>
+                          </a:cxn>
+                        </a:cxnLst>
+                        <a:rect l="l" t="t" r="r" b="b"/>
+                        <a:pathLst>
+                          <a:path w="3762704" h="3762704" fill="none" extrusionOk="0">
+                            <a:moveTo>
+                              <a:pt x="0" y="1881352"/>
+                            </a:moveTo>
+                            <a:cubicBezTo>
+                              <a:pt x="149900" y="860093"/>
+                              <a:pt x="878873" y="-75246"/>
+                              <a:pt x="1881352" y="0"/>
+                            </a:cubicBezTo>
+                            <a:cubicBezTo>
+                              <a:pt x="2807289" y="-17320"/>
+                              <a:pt x="3713831" y="888324"/>
+                              <a:pt x="3762704" y="1881352"/>
+                            </a:cubicBezTo>
+                            <a:cubicBezTo>
+                              <a:pt x="3745267" y="2754109"/>
+                              <a:pt x="2798585" y="3931983"/>
+                              <a:pt x="1881352" y="3762704"/>
+                            </a:cubicBezTo>
+                            <a:cubicBezTo>
+                              <a:pt x="1065780" y="3887812"/>
+                              <a:pt x="84315" y="2940666"/>
+                              <a:pt x="0" y="1881352"/>
+                            </a:cubicBezTo>
+                            <a:close/>
+                          </a:path>
+                          <a:path w="3762704" h="3762704" stroke="0" extrusionOk="0">
+                            <a:moveTo>
+                              <a:pt x="0" y="1881352"/>
+                            </a:moveTo>
+                            <a:cubicBezTo>
+                              <a:pt x="-55676" y="807968"/>
+                              <a:pt x="766722" y="28369"/>
+                              <a:pt x="1881352" y="0"/>
+                            </a:cubicBezTo>
+                            <a:cubicBezTo>
+                              <a:pt x="2944148" y="5001"/>
+                              <a:pt x="3737524" y="843111"/>
+                              <a:pt x="3762704" y="1881352"/>
+                            </a:cubicBezTo>
+                            <a:cubicBezTo>
+                              <a:pt x="3703280" y="2978425"/>
+                              <a:pt x="2911198" y="3813535"/>
+                              <a:pt x="1881352" y="3762704"/>
+                            </a:cubicBezTo>
+                            <a:cubicBezTo>
+                              <a:pt x="708408" y="3689443"/>
+                              <a:pt x="31604" y="2935495"/>
+                              <a:pt x="0" y="1881352"/>
+                            </a:cubicBezTo>
+                            <a:close/>
+                          </a:path>
+                        </a:pathLst>
+                      </a:custGeom>
+                      <ask:type>
+                        <ask:lineSketchNone/>
+                      </ask:type>
+                    </ask:lineSketchStyleProps>
+                  </a:ext>
+                </a:extLst>
+              </a:ln>
+              <a:effectLst>
+                <a:outerShdw blurRad="424591" dist="38100" dir="2700000" algn="tl" rotWithShape="0">
+                  <a:prstClr val="black">
+                    <a:alpha val="40000"/>
+                  </a:prstClr>
+                </a:outerShdw>
+              </a:effectLst>
+            </p:spPr>
+            <p:style>
+              <a:lnRef idx="2">
+                <a:schemeClr val="accent1">
+                  <a:shade val="50000"/>
+                </a:schemeClr>
+              </a:lnRef>
+              <a:fillRef idx="1">
+                <a:schemeClr val="accent1"/>
+              </a:fillRef>
+              <a:effectRef idx="0">
+                <a:schemeClr val="accent1"/>
+              </a:effectRef>
+              <a:fontRef idx="minor">
+                <a:schemeClr val="lt1"/>
+              </a:fontRef>
+            </p:style>
+            <p:txBody>
+              <a:bodyPr rtlCol="0" anchor="ctr"/>
+              <a:lstStyle/>
+              <a:p>
+                <a:pPr algn="ctr"/>
+                <a:endParaRPr lang="fr-FR" dirty="0"/>
+              </a:p>
+            </p:txBody>
+          </p:sp>
+          <p:sp>
+            <p:nvSpPr>
+              <p:cNvPr id="5" name="Ellipse 4">
+                <a:extLst>
+                  <a:ext uri="{FF2B5EF4-FFF2-40B4-BE49-F238E27FC236}">
+                    <a16:creationId xmlns:a16="http://schemas.microsoft.com/office/drawing/2014/main" id="{161D259D-2AB2-C9D1-BC57-5CA7EA415FA5}"/>
+                  </a:ext>
+                </a:extLst>
+              </p:cNvPr>
+              <p:cNvSpPr/>
+              <p:nvPr/>
+            </p:nvSpPr>
+            <p:spPr>
+              <a:xfrm>
+                <a:off x="2106754" y="1408670"/>
+                <a:ext cx="2723494" cy="2723494"/>
+              </a:xfrm>
+              <a:prstGeom prst="ellipse">
+                <a:avLst/>
+              </a:prstGeom>
+              <a:solidFill>
+                <a:srgbClr val="232323"/>
+              </a:solidFill>
+              <a:ln w="76200">
+                <a:noFill/>
+                <a:prstDash val="solid"/>
+                <a:extLst>
+                  <a:ext uri="{C807C97D-BFC1-408E-A445-0C87EB9F89A2}">
+                    <ask:lineSketchStyleProps xmlns:ask="http://schemas.microsoft.com/office/drawing/2018/sketchyshapes" sd="981765707">
+                      <a:custGeom>
+                        <a:avLst/>
+                        <a:gdLst>
+                          <a:gd name="connsiteX0" fmla="*/ 0 w 2723494"/>
+                          <a:gd name="connsiteY0" fmla="*/ 1361747 h 2723494"/>
+                          <a:gd name="connsiteX1" fmla="*/ 1361747 w 2723494"/>
+                          <a:gd name="connsiteY1" fmla="*/ 0 h 2723494"/>
+                          <a:gd name="connsiteX2" fmla="*/ 2723494 w 2723494"/>
+                          <a:gd name="connsiteY2" fmla="*/ 1361747 h 2723494"/>
+                          <a:gd name="connsiteX3" fmla="*/ 1361747 w 2723494"/>
+                          <a:gd name="connsiteY3" fmla="*/ 2723494 h 2723494"/>
+                          <a:gd name="connsiteX4" fmla="*/ 0 w 2723494"/>
+                          <a:gd name="connsiteY4" fmla="*/ 1361747 h 2723494"/>
+                        </a:gdLst>
+                        <a:ahLst/>
+                        <a:cxnLst>
+                          <a:cxn ang="0">
+                            <a:pos x="connsiteX0" y="connsiteY0"/>
+                          </a:cxn>
+                          <a:cxn ang="0">
+                            <a:pos x="connsiteX1" y="connsiteY1"/>
+                          </a:cxn>
+                          <a:cxn ang="0">
+                            <a:pos x="connsiteX2" y="connsiteY2"/>
+                          </a:cxn>
+                          <a:cxn ang="0">
+                            <a:pos x="connsiteX3" y="connsiteY3"/>
+                          </a:cxn>
+                          <a:cxn ang="0">
+                            <a:pos x="connsiteX4" y="connsiteY4"/>
+                          </a:cxn>
+                        </a:cxnLst>
+                        <a:rect l="l" t="t" r="r" b="b"/>
+                        <a:pathLst>
+                          <a:path w="2723494" h="2723494" fill="none" extrusionOk="0">
+                            <a:moveTo>
+                              <a:pt x="0" y="1361747"/>
+                            </a:moveTo>
+                            <a:cubicBezTo>
+                              <a:pt x="114188" y="501144"/>
+                              <a:pt x="674224" y="4259"/>
+                              <a:pt x="1361747" y="0"/>
+                            </a:cubicBezTo>
+                            <a:cubicBezTo>
+                              <a:pt x="2169793" y="95677"/>
+                              <a:pt x="2639040" y="607860"/>
+                              <a:pt x="2723494" y="1361747"/>
+                            </a:cubicBezTo>
+                            <a:cubicBezTo>
+                              <a:pt x="2804351" y="2125544"/>
+                              <a:pt x="2098162" y="2716349"/>
+                              <a:pt x="1361747" y="2723494"/>
+                            </a:cubicBezTo>
+                            <a:cubicBezTo>
+                              <a:pt x="550918" y="2741027"/>
+                              <a:pt x="77434" y="2008850"/>
+                              <a:pt x="0" y="1361747"/>
+                            </a:cubicBezTo>
+                            <a:close/>
+                          </a:path>
+                          <a:path w="2723494" h="2723494" stroke="0" extrusionOk="0">
+                            <a:moveTo>
+                              <a:pt x="0" y="1361747"/>
+                            </a:moveTo>
+                            <a:cubicBezTo>
+                              <a:pt x="-21882" y="648066"/>
+                              <a:pt x="436546" y="-71492"/>
+                              <a:pt x="1361747" y="0"/>
+                            </a:cubicBezTo>
+                            <a:cubicBezTo>
+                              <a:pt x="2197664" y="-12378"/>
+                              <a:pt x="2698578" y="655054"/>
+                              <a:pt x="2723494" y="1361747"/>
+                            </a:cubicBezTo>
+                            <a:cubicBezTo>
+                              <a:pt x="2702308" y="2120900"/>
+                              <a:pt x="2090179" y="2751449"/>
+                              <a:pt x="1361747" y="2723494"/>
+                            </a:cubicBezTo>
+                            <a:cubicBezTo>
+                              <a:pt x="703934" y="2662494"/>
+                              <a:pt x="-123110" y="2142059"/>
+                              <a:pt x="0" y="1361747"/>
+                            </a:cubicBezTo>
+                            <a:close/>
+                          </a:path>
+                        </a:pathLst>
+                      </a:custGeom>
+                      <ask:type>
+                        <ask:lineSketchNone/>
+                      </ask:type>
+                    </ask:lineSketchStyleProps>
+                  </a:ext>
+                </a:extLst>
+              </a:ln>
+              <a:effectLst>
+                <a:outerShdw blurRad="424591" dist="38100" dir="2700000" algn="tl" rotWithShape="0">
+                  <a:prstClr val="black">
+                    <a:alpha val="40000"/>
+                  </a:prstClr>
+                </a:outerShdw>
+              </a:effectLst>
+            </p:spPr>
+            <p:style>
+              <a:lnRef idx="2">
+                <a:schemeClr val="accent1">
+                  <a:shade val="50000"/>
+                </a:schemeClr>
+              </a:lnRef>
+              <a:fillRef idx="1">
+                <a:schemeClr val="accent1"/>
+              </a:fillRef>
+              <a:effectRef idx="0">
+                <a:schemeClr val="accent1"/>
+              </a:effectRef>
+              <a:fontRef idx="minor">
+                <a:schemeClr val="lt1"/>
+              </a:fontRef>
+            </p:style>
+            <p:txBody>
+              <a:bodyPr rtlCol="0" anchor="ctr"/>
+              <a:lstStyle/>
+              <a:p>
+                <a:pPr algn="ctr"/>
+                <a:endParaRPr lang="fr-FR" dirty="0"/>
+              </a:p>
+            </p:txBody>
+          </p:sp>
+        </p:grpSp>
+        <p:pic>
+          <p:nvPicPr>
+            <p:cNvPr id="1028" name="Picture 4" descr="Eye - Free medical icons">
+              <a:extLst>
+                <a:ext uri="{FF2B5EF4-FFF2-40B4-BE49-F238E27FC236}">
+                  <a16:creationId xmlns:a16="http://schemas.microsoft.com/office/drawing/2014/main" id="{B10A1E44-72BF-3A8A-F5FC-96F630605722}"/>
+                </a:ext>
+              </a:extLst>
+            </p:cNvPr>
+            <p:cNvPicPr>
+              <a:picLocks noChangeAspect="1" noChangeArrowheads="1"/>
+            </p:cNvPicPr>
+            <p:nvPr/>
+          </p:nvPicPr>
+          <p:blipFill>
+            <a:blip r:embed="rId2">
+              <a:extLst>
+                <a:ext uri="{28A0092B-C50C-407E-A947-70E740481C1C}">
+                  <a14:useLocalDpi xmlns:a14="http://schemas.microsoft.com/office/drawing/2010/main" val="0"/>
+                </a:ext>
+              </a:extLst>
+            </a:blip>
+            <a:srcRect/>
+            <a:stretch>
+              <a:fillRect/>
+            </a:stretch>
+          </p:blipFill>
+          <p:spPr bwMode="auto">
+            <a:xfrm>
+              <a:off x="2211859" y="1843571"/>
+              <a:ext cx="1235675" cy="1235675"/>
+            </a:xfrm>
+            <a:prstGeom prst="rect">
+              <a:avLst/>
+            </a:prstGeom>
+            <a:noFill/>
+            <a:extLst>
+              <a:ext uri="{909E8E84-426E-40DD-AFC4-6F175D3DCCD1}">
+                <a14:hiddenFill xmlns:a14="http://schemas.microsoft.com/office/drawing/2010/main">
+                  <a:solidFill>
+                    <a:srgbClr val="FFFFFF"/>
+                  </a:solidFill>
+                </a14:hiddenFill>
+              </a:ext>
+            </a:extLst>
+          </p:spPr>
+        </p:pic>
+      </p:grpSp>
+    </p:spTree>
+    <p:extLst>
+      <p:ext uri="{BB962C8B-B14F-4D97-AF65-F5344CB8AC3E}">
+        <p14:creationId xmlns:p14="http://schemas.microsoft.com/office/powerpoint/2010/main" val="1203948948"/>
+      </p:ext>
+    </p:extLst>
+  </p:cSld>
+  <p:clrMapOvr>
+    <a:masterClrMapping/>
+  </p:clrMapOvr>
+</p:sld>
+</file>
+
 <file path=ppt/theme/theme1.xml><?xml version="1.0" encoding="utf-8"?>
 <a:theme xmlns:a="http://schemas.openxmlformats.org/drawingml/2006/main" name="Thème Office">
   <a:themeElements>

</xml_diff>